<commit_message>
Links from Lessons to Labs
</commit_message>
<xml_diff>
--- a/Instructor-Led/Lessons/Module1/Module1_Lesson4 How to start Azure.pptx
+++ b/Instructor-Led/Lessons/Module1/Module1_Lesson4 How to start Azure.pptx
@@ -178,206 +178,6 @@
 </p:cmAuthorLst>
 </file>
 
-<file path=ppt/comments/comment1.xml><?xml version="1.0" encoding="utf-8"?>
-<p:cmLst xmlns:a="http://schemas.openxmlformats.org/drawingml/2006/main" xmlns:r="http://schemas.openxmlformats.org/officeDocument/2006/relationships" xmlns:p="http://schemas.openxmlformats.org/presentationml/2006/main">
-  <p:cm authorId="3" dt="2016-06-02T12:57:27.705" idx="1">
-    <p:pos x="2476" y="1444"/>
-    <p:text>Make blue bar a touch taller for more margins</p:text>
-    <p:extLst>
-      <p:ext uri="{C676402C-5697-4E1C-873F-D02D1690AC5C}">
-        <p15:threadingInfo xmlns:p15="http://schemas.microsoft.com/office/powerpoint/2012/main" timeZoneBias="420"/>
-      </p:ext>
-    </p:extLst>
-  </p:cm>
-  <p:cm authorId="3" dt="2016-06-21T01:50:34.276" idx="2">
-    <p:pos x="2476" y="1540"/>
-    <p:text>modified</p:text>
-    <p:extLst>
-      <p:ext uri="{C676402C-5697-4E1C-873F-D02D1690AC5C}">
-        <p15:threadingInfo xmlns:p15="http://schemas.microsoft.com/office/powerpoint/2012/main" timeZoneBias="-540">
-          <p15:parentCm authorId="3" idx="1"/>
-        </p15:threadingInfo>
-      </p:ext>
-    </p:extLst>
-  </p:cm>
-</p:cmLst>
-</file>
-
-<file path=ppt/comments/comment2.xml><?xml version="1.0" encoding="utf-8"?>
-<p:cmLst xmlns:a="http://schemas.openxmlformats.org/drawingml/2006/main" xmlns:r="http://schemas.openxmlformats.org/officeDocument/2006/relationships" xmlns:p="http://schemas.openxmlformats.org/presentationml/2006/main">
-  <p:cm authorId="3" dt="2016-06-02T12:57:52.184" idx="3">
-    <p:pos x="10" y="10"/>
-    <p:text>Providers? (rather than options- re-word)</p:text>
-    <p:extLst>
-      <p:ext uri="{C676402C-5697-4E1C-873F-D02D1690AC5C}">
-        <p15:threadingInfo xmlns:p15="http://schemas.microsoft.com/office/powerpoint/2012/main" timeZoneBias="420"/>
-      </p:ext>
-    </p:extLst>
-  </p:cm>
-  <p:cm authorId="3" dt="2016-06-21T01:52:56.578" idx="4">
-    <p:pos x="10" y="106"/>
-    <p:text>modified</p:text>
-    <p:extLst>
-      <p:ext uri="{C676402C-5697-4E1C-873F-D02D1690AC5C}">
-        <p15:threadingInfo xmlns:p15="http://schemas.microsoft.com/office/powerpoint/2012/main" timeZoneBias="-540">
-          <p15:parentCm authorId="3" idx="3"/>
-        </p15:threadingInfo>
-      </p:ext>
-    </p:extLst>
-  </p:cm>
-</p:cmLst>
-</file>
-
-<file path=ppt/comments/comment3.xml><?xml version="1.0" encoding="utf-8"?>
-<p:cmLst xmlns:a="http://schemas.openxmlformats.org/drawingml/2006/main" xmlns:r="http://schemas.openxmlformats.org/officeDocument/2006/relationships" xmlns:p="http://schemas.openxmlformats.org/presentationml/2006/main">
-  <p:cm authorId="3" dt="2016-06-02T12:58:07.437" idx="5">
-    <p:pos x="1" y="0"/>
-    <p:text>Make blue bar a touch taller</p:text>
-    <p:extLst mod="1">
-      <p:ext uri="{C676402C-5697-4E1C-873F-D02D1690AC5C}">
-        <p15:threadingInfo xmlns:p15="http://schemas.microsoft.com/office/powerpoint/2012/main" timeZoneBias="420"/>
-      </p:ext>
-    </p:extLst>
-  </p:cm>
-  <p:cm authorId="3" dt="2016-06-21T01:54:31.248" idx="6">
-    <p:pos x="1" y="97"/>
-    <p:text>modified</p:text>
-    <p:extLst mod="1">
-      <p:ext uri="{C676402C-5697-4E1C-873F-D02D1690AC5C}">
-        <p15:threadingInfo xmlns:p15="http://schemas.microsoft.com/office/powerpoint/2012/main" timeZoneBias="-540">
-          <p15:parentCm authorId="3" idx="5"/>
-        </p15:threadingInfo>
-      </p:ext>
-    </p:extLst>
-  </p:cm>
-</p:cmLst>
-</file>
-
-<file path=ppt/comments/comment4.xml><?xml version="1.0" encoding="utf-8"?>
-<p:cmLst xmlns:a="http://schemas.openxmlformats.org/drawingml/2006/main" xmlns:r="http://schemas.openxmlformats.org/officeDocument/2006/relationships" xmlns:p="http://schemas.openxmlformats.org/presentationml/2006/main">
-  <p:cm authorId="3" dt="2016-06-21T02:02:04.477" idx="8">
-    <p:pos x="1" y="97"/>
-    <p:text>modified</p:text>
-    <p:extLst mod="1">
-      <p:ext uri="{C676402C-5697-4E1C-873F-D02D1690AC5C}">
-        <p15:threadingInfo xmlns:p15="http://schemas.microsoft.com/office/powerpoint/2012/main" timeZoneBias="-540">
-          <p15:parentCm authorId="3" idx="7"/>
-        </p15:threadingInfo>
-      </p:ext>
-    </p:extLst>
-  </p:cm>
-  <p:cm authorId="3" dt="2016-06-02T12:58:18.683" idx="7">
-    <p:pos x="1" y="0"/>
-    <p:text>Simplify gray bar text if possible</p:text>
-    <p:extLst mod="1">
-      <p:ext uri="{C676402C-5697-4E1C-873F-D02D1690AC5C}">
-        <p15:threadingInfo xmlns:p15="http://schemas.microsoft.com/office/powerpoint/2012/main" timeZoneBias="420"/>
-      </p:ext>
-    </p:extLst>
-  </p:cm>
-</p:cmLst>
-</file>
-
-<file path=ppt/comments/comment5.xml><?xml version="1.0" encoding="utf-8"?>
-<p:cmLst xmlns:a="http://schemas.openxmlformats.org/drawingml/2006/main" xmlns:r="http://schemas.openxmlformats.org/officeDocument/2006/relationships" xmlns:p="http://schemas.openxmlformats.org/presentationml/2006/main">
-  <p:cm authorId="3" dt="2016-06-21T02:09:17.856" idx="10">
-    <p:pos x="10" y="106"/>
-    <p:text>modified</p:text>
-    <p:extLst>
-      <p:ext uri="{C676402C-5697-4E1C-873F-D02D1690AC5C}">
-        <p15:threadingInfo xmlns:p15="http://schemas.microsoft.com/office/powerpoint/2012/main" timeZoneBias="-540">
-          <p15:parentCm authorId="3" idx="9"/>
-        </p15:threadingInfo>
-      </p:ext>
-    </p:extLst>
-  </p:cm>
-  <p:cm authorId="3" dt="2016-06-02T12:58:31.872" idx="9">
-    <p:pos x="1" y="1"/>
-    <p:text>Simplify gray bar text if possible</p:text>
-    <p:extLst mod="1">
-      <p:ext uri="{C676402C-5697-4E1C-873F-D02D1690AC5C}">
-        <p15:threadingInfo xmlns:p15="http://schemas.microsoft.com/office/powerpoint/2012/main" timeZoneBias="420"/>
-      </p:ext>
-    </p:extLst>
-  </p:cm>
-</p:cmLst>
-</file>
-
-<file path=ppt/comments/comment6.xml><?xml version="1.0" encoding="utf-8"?>
-<p:cmLst xmlns:a="http://schemas.openxmlformats.org/drawingml/2006/main" xmlns:r="http://schemas.openxmlformats.org/officeDocument/2006/relationships" xmlns:p="http://schemas.openxmlformats.org/presentationml/2006/main">
-  <p:cm authorId="3" dt="2016-06-02T12:58:36.663" idx="11">
-    <p:pos x="10" y="10"/>
-    <p:text>More separation between text bullets and graphic</p:text>
-    <p:extLst>
-      <p:ext uri="{C676402C-5697-4E1C-873F-D02D1690AC5C}">
-        <p15:threadingInfo xmlns:p15="http://schemas.microsoft.com/office/powerpoint/2012/main" timeZoneBias="420"/>
-      </p:ext>
-    </p:extLst>
-  </p:cm>
-  <p:cm authorId="3" dt="2016-06-21T02:22:19.029" idx="12">
-    <p:pos x="10" y="106"/>
-    <p:text>modified</p:text>
-    <p:extLst>
-      <p:ext uri="{C676402C-5697-4E1C-873F-D02D1690AC5C}">
-        <p15:threadingInfo xmlns:p15="http://schemas.microsoft.com/office/powerpoint/2012/main" timeZoneBias="-540">
-          <p15:parentCm authorId="3" idx="11"/>
-        </p15:threadingInfo>
-      </p:ext>
-    </p:extLst>
-  </p:cm>
-</p:cmLst>
-</file>
-
-<file path=ppt/comments/comment7.xml><?xml version="1.0" encoding="utf-8"?>
-<p:cmLst xmlns:a="http://schemas.openxmlformats.org/drawingml/2006/main" xmlns:r="http://schemas.openxmlformats.org/officeDocument/2006/relationships" xmlns:p="http://schemas.openxmlformats.org/presentationml/2006/main">
-  <p:cm authorId="3" dt="2016-06-02T12:59:05.733" idx="13">
-    <p:pos x="1" y="1"/>
-    <p:text>Move gray bar down a touch</p:text>
-    <p:extLst mod="1">
-      <p:ext uri="{C676402C-5697-4E1C-873F-D02D1690AC5C}">
-        <p15:threadingInfo xmlns:p15="http://schemas.microsoft.com/office/powerpoint/2012/main" timeZoneBias="420"/>
-      </p:ext>
-    </p:extLst>
-  </p:cm>
-  <p:cm authorId="3" dt="2016-06-21T02:30:38.143" idx="14">
-    <p:pos x="-10" y="86"/>
-    <p:text>modified</p:text>
-    <p:extLst mod="1">
-      <p:ext uri="{C676402C-5697-4E1C-873F-D02D1690AC5C}">
-        <p15:threadingInfo xmlns:p15="http://schemas.microsoft.com/office/powerpoint/2012/main" timeZoneBias="-540">
-          <p15:parentCm authorId="3" idx="13"/>
-        </p15:threadingInfo>
-      </p:ext>
-    </p:extLst>
-  </p:cm>
-</p:cmLst>
-</file>
-
-<file path=ppt/comments/comment8.xml><?xml version="1.0" encoding="utf-8"?>
-<p:cmLst xmlns:a="http://schemas.openxmlformats.org/drawingml/2006/main" xmlns:r="http://schemas.openxmlformats.org/officeDocument/2006/relationships" xmlns:p="http://schemas.openxmlformats.org/presentationml/2006/main">
-  <p:cm authorId="3" dt="2016-06-02T12:59:30.358" idx="15">
-    <p:pos x="4839" y="1386"/>
-    <p:text>It is the end of the lesson :) "Now you know..."</p:text>
-    <p:extLst mod="1">
-      <p:ext uri="{C676402C-5697-4E1C-873F-D02D1690AC5C}">
-        <p15:threadingInfo xmlns:p15="http://schemas.microsoft.com/office/powerpoint/2012/main" timeZoneBias="420"/>
-      </p:ext>
-    </p:extLst>
-  </p:cm>
-  <p:cm authorId="3" dt="2016-06-21T01:58:17.808" idx="16">
-    <p:pos x="4838" y="1483"/>
-    <p:text>modified</p:text>
-    <p:extLst mod="1">
-      <p:ext uri="{C676402C-5697-4E1C-873F-D02D1690AC5C}">
-        <p15:threadingInfo xmlns:p15="http://schemas.microsoft.com/office/powerpoint/2012/main" timeZoneBias="-540">
-          <p15:parentCm authorId="3" idx="15"/>
-        </p15:threadingInfo>
-      </p:ext>
-    </p:extLst>
-  </p:cm>
-</p:cmLst>
-</file>
-
 <file path=ppt/notesMasters/notesMaster1.xml><?xml version="1.0" encoding="utf-8"?>
 <p:notesMaster xmlns:a="http://schemas.openxmlformats.org/drawingml/2006/main" xmlns:r="http://schemas.openxmlformats.org/officeDocument/2006/relationships" xmlns:p="http://schemas.openxmlformats.org/presentationml/2006/main">
   <p:cSld>
@@ -2899,7 +2699,61 @@
           <a:bodyPr/>
           <a:lstStyle/>
           <a:p>
-            <a:endParaRPr lang="en-US" dirty="0"/>
+            <a:pPr marL="171450" indent="-171450">
+              <a:buFont typeface="Arial"/>
+              <a:buChar char="•"/>
+            </a:pPr>
+            <a:r>
+              <a:rPr lang="en-US" b="0" baseline="0" dirty="0" smtClean="0"/>
+              <a:t>The Module 1 </a:t>
+            </a:r>
+            <a:r>
+              <a:rPr lang="en-US" b="0" baseline="0" smtClean="0"/>
+              <a:t>Lesson </a:t>
+            </a:r>
+            <a:r>
+              <a:rPr lang="en-US" b="0" baseline="0" smtClean="0"/>
+              <a:t>4 </a:t>
+            </a:r>
+            <a:r>
+              <a:rPr lang="en-US" b="0" baseline="0" dirty="0" smtClean="0"/>
+              <a:t>Lab should be completed at this time:</a:t>
+            </a:r>
+            <a:endParaRPr lang="en-US" dirty="0" smtClean="0"/>
+          </a:p>
+          <a:p>
+            <a:pPr marL="628650" lvl="1" indent="-171450">
+              <a:buFont typeface="Arial"/>
+              <a:buChar char="•"/>
+            </a:pPr>
+            <a:r>
+              <a:rPr lang="en-US" dirty="0" smtClean="0"/>
+              <a:t>https://</a:t>
+            </a:r>
+            <a:r>
+              <a:rPr lang="en-US" dirty="0" err="1" smtClean="0"/>
+              <a:t>github.com</a:t>
+            </a:r>
+            <a:r>
+              <a:rPr lang="en-US" dirty="0" smtClean="0"/>
+              <a:t>/</a:t>
+            </a:r>
+            <a:r>
+              <a:rPr lang="en-US" dirty="0" err="1" smtClean="0"/>
+              <a:t>MSFTImagine</a:t>
+            </a:r>
+            <a:r>
+              <a:rPr lang="en-US" dirty="0" smtClean="0"/>
+              <a:t>/</a:t>
+            </a:r>
+            <a:r>
+              <a:rPr lang="en-US" dirty="0" err="1" smtClean="0"/>
+              <a:t>computerscience</a:t>
+            </a:r>
+            <a:r>
+              <a:rPr lang="en-US" dirty="0" smtClean="0"/>
+              <a:t>/tree/master/Instructor-Led/Labs/Module1</a:t>
+            </a:r>
           </a:p>
         </p:txBody>
       </p:sp>

</xml_diff>